<commit_message>
fix bug of too long line in ppt
</commit_message>
<xml_diff>
--- a/2016-05-10.pptx
+++ b/2016-05-10.pptx
@@ -4311,7 +4311,7 @@
               <a:lnSpc>
                 <a:spcPts val="7500"/>
               </a:lnSpc>
-              <a:defRPr sz="5600" b="0">
+              <a:defRPr sz="5001" b="0">
                 <a:solidFill>
                   <a:srgbClr val="FDBF2D"/>
                 </a:solidFill>
@@ -4327,7 +4327,7 @@
               <a:lnSpc>
                 <a:spcPts val="7500"/>
               </a:lnSpc>
-              <a:defRPr sz="5600" b="0">
+              <a:defRPr sz="5001" b="0">
                 <a:solidFill>
                   <a:srgbClr val="FDBF2D"/>
                 </a:solidFill>

</xml_diff>